<commit_message>
Changed a little in the PWD
</commit_message>
<xml_diff>
--- a/SWD-DesignPatternsAssignmentGroup11-Mediator-presentation.pptx
+++ b/SWD-DesignPatternsAssignmentGroup11-Mediator-presentation.pptx
@@ -477,7 +477,7 @@
           <a:p>
             <a:fld id="{C6A99D60-0761-488F-9DD7-6BF9BE394889}" type="slidenum">
               <a:rPr lang="da-DK" smtClean="0"/>
-              <a:t>‹#›</a:t>
+              <a:t>‹nr.›</a:t>
             </a:fld>
             <a:endParaRPr lang="da-DK"/>
           </a:p>
@@ -734,7 +734,7 @@
           <a:p>
             <a:fld id="{C6A99D60-0761-488F-9DD7-6BF9BE394889}" type="slidenum">
               <a:rPr lang="da-DK" smtClean="0"/>
-              <a:t>‹#›</a:t>
+              <a:t>‹nr.›</a:t>
             </a:fld>
             <a:endParaRPr lang="da-DK"/>
           </a:p>
@@ -975,7 +975,7 @@
           <a:p>
             <a:fld id="{C6A99D60-0761-488F-9DD7-6BF9BE394889}" type="slidenum">
               <a:rPr lang="da-DK" smtClean="0"/>
-              <a:t>‹#›</a:t>
+              <a:t>‹nr.›</a:t>
             </a:fld>
             <a:endParaRPr lang="da-DK"/>
           </a:p>
@@ -1285,7 +1285,7 @@
           <a:p>
             <a:fld id="{C6A99D60-0761-488F-9DD7-6BF9BE394889}" type="slidenum">
               <a:rPr lang="da-DK" smtClean="0"/>
-              <a:t>‹#›</a:t>
+              <a:t>‹nr.›</a:t>
             </a:fld>
             <a:endParaRPr lang="da-DK"/>
           </a:p>
@@ -1758,7 +1758,7 @@
           <a:p>
             <a:fld id="{C6A99D60-0761-488F-9DD7-6BF9BE394889}" type="slidenum">
               <a:rPr lang="da-DK" smtClean="0"/>
-              <a:t>‹#›</a:t>
+              <a:t>‹nr.›</a:t>
             </a:fld>
             <a:endParaRPr lang="da-DK"/>
           </a:p>
@@ -2295,7 +2295,7 @@
           <a:p>
             <a:fld id="{C6A99D60-0761-488F-9DD7-6BF9BE394889}" type="slidenum">
               <a:rPr lang="da-DK" smtClean="0"/>
-              <a:t>‹#›</a:t>
+              <a:t>‹nr.›</a:t>
             </a:fld>
             <a:endParaRPr lang="da-DK"/>
           </a:p>
@@ -3069,7 +3069,7 @@
           <a:p>
             <a:fld id="{C6A99D60-0761-488F-9DD7-6BF9BE394889}" type="slidenum">
               <a:rPr lang="da-DK" smtClean="0"/>
-              <a:t>‹#›</a:t>
+              <a:t>‹nr.›</a:t>
             </a:fld>
             <a:endParaRPr lang="da-DK"/>
           </a:p>
@@ -3244,7 +3244,7 @@
           <a:p>
             <a:fld id="{C6A99D60-0761-488F-9DD7-6BF9BE394889}" type="slidenum">
               <a:rPr lang="da-DK" smtClean="0"/>
-              <a:t>‹#›</a:t>
+              <a:t>‹nr.›</a:t>
             </a:fld>
             <a:endParaRPr lang="da-DK"/>
           </a:p>
@@ -3477,7 +3477,7 @@
           <a:p>
             <a:fld id="{C6A99D60-0761-488F-9DD7-6BF9BE394889}" type="slidenum">
               <a:rPr lang="da-DK" smtClean="0"/>
-              <a:t>‹#›</a:t>
+              <a:t>‹nr.›</a:t>
             </a:fld>
             <a:endParaRPr lang="da-DK"/>
           </a:p>
@@ -3647,7 +3647,7 @@
           <a:p>
             <a:fld id="{C6A99D60-0761-488F-9DD7-6BF9BE394889}" type="slidenum">
               <a:rPr lang="da-DK" smtClean="0"/>
-              <a:t>‹#›</a:t>
+              <a:t>‹nr.›</a:t>
             </a:fld>
             <a:endParaRPr lang="da-DK"/>
           </a:p>
@@ -3946,7 +3946,7 @@
           <a:p>
             <a:fld id="{C6A99D60-0761-488F-9DD7-6BF9BE394889}" type="slidenum">
               <a:rPr lang="da-DK" smtClean="0"/>
-              <a:t>‹#›</a:t>
+              <a:t>‹nr.›</a:t>
             </a:fld>
             <a:endParaRPr lang="da-DK"/>
           </a:p>
@@ -4178,7 +4178,7 @@
           <a:p>
             <a:fld id="{C6A99D60-0761-488F-9DD7-6BF9BE394889}" type="slidenum">
               <a:rPr lang="da-DK" smtClean="0"/>
-              <a:t>‹#›</a:t>
+              <a:t>‹nr.›</a:t>
             </a:fld>
             <a:endParaRPr lang="da-DK"/>
           </a:p>
@@ -4557,7 +4557,7 @@
           <a:p>
             <a:fld id="{C6A99D60-0761-488F-9DD7-6BF9BE394889}" type="slidenum">
               <a:rPr lang="da-DK" smtClean="0"/>
-              <a:t>‹#›</a:t>
+              <a:t>‹nr.›</a:t>
             </a:fld>
             <a:endParaRPr lang="da-DK"/>
           </a:p>
@@ -4675,7 +4675,7 @@
           <a:p>
             <a:fld id="{C6A99D60-0761-488F-9DD7-6BF9BE394889}" type="slidenum">
               <a:rPr lang="da-DK" smtClean="0"/>
-              <a:t>‹#›</a:t>
+              <a:t>‹nr.›</a:t>
             </a:fld>
             <a:endParaRPr lang="da-DK"/>
           </a:p>
@@ -4770,7 +4770,7 @@
           <a:p>
             <a:fld id="{C6A99D60-0761-488F-9DD7-6BF9BE394889}" type="slidenum">
               <a:rPr lang="da-DK" smtClean="0"/>
-              <a:t>‹#›</a:t>
+              <a:t>‹nr.›</a:t>
             </a:fld>
             <a:endParaRPr lang="da-DK"/>
           </a:p>
@@ -5019,7 +5019,7 @@
           <a:p>
             <a:fld id="{C6A99D60-0761-488F-9DD7-6BF9BE394889}" type="slidenum">
               <a:rPr lang="da-DK" smtClean="0"/>
-              <a:t>‹#›</a:t>
+              <a:t>‹nr.›</a:t>
             </a:fld>
             <a:endParaRPr lang="da-DK"/>
           </a:p>
@@ -5276,7 +5276,7 @@
           <a:p>
             <a:fld id="{C6A99D60-0761-488F-9DD7-6BF9BE394889}" type="slidenum">
               <a:rPr lang="da-DK" smtClean="0"/>
-              <a:t>‹#›</a:t>
+              <a:t>‹nr.›</a:t>
             </a:fld>
             <a:endParaRPr lang="da-DK"/>
           </a:p>
@@ -5555,7 +5555,7 @@
           <a:p>
             <a:fld id="{C6A99D60-0761-488F-9DD7-6BF9BE394889}" type="slidenum">
               <a:rPr lang="da-DK" smtClean="0"/>
-              <a:t>‹#›</a:t>
+              <a:t>‹nr.›</a:t>
             </a:fld>
             <a:endParaRPr lang="da-DK"/>
           </a:p>
@@ -6979,6 +6979,42 @@
           </a:p>
         </p:txBody>
       </p:sp>
+      <p:pic>
+        <p:nvPicPr>
+          <p:cNvPr id="5" name="Billede 4" descr="Et billede, der indeholder tekst, græs, sidder, sort&#10;&#10;Automatisk genereret beskrivelse">
+            <a:extLst>
+              <a:ext uri="{FF2B5EF4-FFF2-40B4-BE49-F238E27FC236}">
+                <a16:creationId xmlns:a16="http://schemas.microsoft.com/office/drawing/2014/main" id="{CE9FA8C0-3631-4893-9C53-62EDE5247C2F}"/>
+              </a:ext>
+            </a:extLst>
+          </p:cNvPr>
+          <p:cNvPicPr>
+            <a:picLocks noChangeAspect="1"/>
+          </p:cNvPicPr>
+          <p:nvPr/>
+        </p:nvPicPr>
+        <p:blipFill>
+          <a:blip r:embed="rId2">
+            <a:extLst>
+              <a:ext uri="{28A0092B-C50C-407E-A947-70E740481C1C}">
+                <a14:useLocalDpi xmlns:a14="http://schemas.microsoft.com/office/drawing/2010/main" val="0"/>
+              </a:ext>
+            </a:extLst>
+          </a:blip>
+          <a:stretch>
+            <a:fillRect/>
+          </a:stretch>
+        </p:blipFill>
+        <p:spPr>
+          <a:xfrm>
+            <a:off x="7043374" y="2057401"/>
+            <a:ext cx="4462826" cy="4161284"/>
+          </a:xfrm>
+          <a:prstGeom prst="rect">
+            <a:avLst/>
+          </a:prstGeom>
+        </p:spPr>
+      </p:pic>
     </p:spTree>
     <p:extLst>
       <p:ext uri="{BB962C8B-B14F-4D97-AF65-F5344CB8AC3E}">

</xml_diff>